<commit_message>
Update to Group Presentation
Changes made to architecture
</commit_message>
<xml_diff>
--- a/Goup Presentation.pptx
+++ b/Goup Presentation.pptx
@@ -5,11 +5,12 @@
     <p:sldMasterId id="2147483648" r:id="rId1"/>
   </p:sldMasterIdLst>
   <p:notesMasterIdLst>
-    <p:notesMasterId r:id="rId4"/>
+    <p:notesMasterId r:id="rId5"/>
   </p:notesMasterIdLst>
   <p:sldIdLst>
     <p:sldId id="256" r:id="rId2"/>
     <p:sldId id="257" r:id="rId3"/>
+    <p:sldId id="258" r:id="rId4"/>
   </p:sldIdLst>
   <p:sldSz cx="12192000" cy="6858000"/>
   <p:notesSz cx="6858000" cy="9144000"/>
@@ -108,6 +109,11 @@
       </a:defRPr>
     </a:lvl9pPr>
   </p:defaultTextStyle>
+  <p:extLst>
+    <p:ext uri="{EFAFB233-063F-42B5-8137-9DF3F51BA10A}">
+      <p15:sldGuideLst xmlns:p15="http://schemas.microsoft.com/office/powerpoint/2012/main"/>
+    </p:ext>
+  </p:extLst>
 </p:presentation>
 </file>
 
@@ -197,7 +203,7 @@
           <a:p>
             <a:fld id="{5CE5BAD7-3F94-42BF-A96C-E8B23019DFA2}" type="datetimeFigureOut">
               <a:rPr lang="en-US" smtClean="0"/>
-              <a:t>2/23/2018</a:t>
+              <a:t>2/25/2018</a:t>
             </a:fld>
             <a:endParaRPr lang="en-US"/>
           </a:p>
@@ -603,7 +609,7 @@
           <a:p>
             <a:fld id="{E9C5A867-6257-48F1-85CC-5443AFF7B561}" type="datetime1">
               <a:rPr lang="en-US" smtClean="0"/>
-              <a:t>2/23/2018</a:t>
+              <a:t>2/25/2018</a:t>
             </a:fld>
             <a:endParaRPr lang="en-US" dirty="0"/>
           </a:p>
@@ -809,7 +815,7 @@
           <a:p>
             <a:fld id="{35E9F54F-3975-4DBA-828B-339A39BE04F9}" type="datetime1">
               <a:rPr lang="en-US" smtClean="0"/>
-              <a:t>2/23/2018</a:t>
+              <a:t>2/25/2018</a:t>
             </a:fld>
             <a:endParaRPr lang="en-US" dirty="0"/>
           </a:p>
@@ -1019,7 +1025,7 @@
           <a:p>
             <a:fld id="{48752FCC-DCDD-497E-B9B7-B31CD6AD2871}" type="datetime1">
               <a:rPr lang="en-US" smtClean="0"/>
-              <a:t>2/23/2018</a:t>
+              <a:t>2/25/2018</a:t>
             </a:fld>
             <a:endParaRPr lang="en-US" dirty="0"/>
           </a:p>
@@ -1215,7 +1221,7 @@
           <a:p>
             <a:fld id="{DD5EFAFF-2541-4EDF-BB6C-1BD889D84689}" type="datetime1">
               <a:rPr lang="en-US" smtClean="0"/>
-              <a:t>2/23/2018</a:t>
+              <a:t>2/25/2018</a:t>
             </a:fld>
             <a:endParaRPr lang="en-US" dirty="0"/>
           </a:p>
@@ -1489,7 +1495,7 @@
           <a:p>
             <a:fld id="{8B5C916D-66D0-4847-8B46-78FCE0EF77A3}" type="datetime1">
               <a:rPr lang="en-US" smtClean="0"/>
-              <a:t>2/23/2018</a:t>
+              <a:t>2/25/2018</a:t>
             </a:fld>
             <a:endParaRPr lang="en-US" dirty="0"/>
           </a:p>
@@ -1752,7 +1758,7 @@
           <a:p>
             <a:fld id="{CBE96D26-DC82-4B95-92B3-293F371AA9BB}" type="datetime1">
               <a:rPr lang="en-US" smtClean="0"/>
-              <a:t>2/23/2018</a:t>
+              <a:t>2/25/2018</a:t>
             </a:fld>
             <a:endParaRPr lang="en-US" dirty="0"/>
           </a:p>
@@ -2163,7 +2169,7 @@
           <a:p>
             <a:fld id="{50BE735D-B274-4293-A303-E4C9DC1F839F}" type="datetime1">
               <a:rPr lang="en-US" smtClean="0"/>
-              <a:t>2/23/2018</a:t>
+              <a:t>2/25/2018</a:t>
             </a:fld>
             <a:endParaRPr lang="en-US" dirty="0"/>
           </a:p>
@@ -2307,7 +2313,7 @@
           <a:p>
             <a:fld id="{7460E6C2-C6A9-40D6-BD32-CDE523B94BB0}" type="datetime1">
               <a:rPr lang="en-US" smtClean="0"/>
-              <a:t>2/23/2018</a:t>
+              <a:t>2/25/2018</a:t>
             </a:fld>
             <a:endParaRPr lang="en-US" dirty="0"/>
           </a:p>
@@ -2428,7 +2434,7 @@
           <a:p>
             <a:fld id="{14C49259-6DE9-4794-A32C-94A158D2E5FF}" type="datetime1">
               <a:rPr lang="en-US" smtClean="0"/>
-              <a:t>2/23/2018</a:t>
+              <a:t>2/25/2018</a:t>
             </a:fld>
             <a:endParaRPr lang="en-US" dirty="0"/>
           </a:p>
@@ -2674,7 +2680,7 @@
           <a:p>
             <a:fld id="{6E7651E5-5BEA-473C-B1A1-686E93A9DF24}" type="datetime1">
               <a:rPr lang="en-US" smtClean="0"/>
-              <a:t>2/23/2018</a:t>
+              <a:t>2/25/2018</a:t>
             </a:fld>
             <a:endParaRPr lang="en-US" dirty="0"/>
           </a:p>
@@ -3114,7 +3120,7 @@
           <a:p>
             <a:fld id="{C4694BA3-665B-42A7-833E-943E73F7A4A5}" type="datetime1">
               <a:rPr lang="en-US" smtClean="0"/>
-              <a:t>2/23/2018</a:t>
+              <a:t>2/25/2018</a:t>
             </a:fld>
             <a:endParaRPr lang="en-US" dirty="0"/>
           </a:p>
@@ -3435,7 +3441,7 @@
           <a:p>
             <a:fld id="{FD380A68-3637-42E0-8BFB-1D9133DD01EB}" type="datetime1">
               <a:rPr lang="en-US" smtClean="0"/>
-              <a:t>2/23/2018</a:t>
+              <a:t>2/25/2018</a:t>
             </a:fld>
             <a:endParaRPr lang="en-US" dirty="0"/>
           </a:p>
@@ -3962,18 +3968,59 @@
             <p:ph type="subTitle" idx="1"/>
           </p:nvPr>
         </p:nvSpPr>
-        <p:spPr/>
-        <p:txBody>
-          <a:bodyPr/>
-          <a:lstStyle/>
+        <p:spPr>
+          <a:xfrm>
+            <a:off x="2417780" y="3531204"/>
+            <a:ext cx="8637072" cy="1689950"/>
+          </a:xfrm>
+        </p:spPr>
+        <p:txBody>
+          <a:bodyPr/>
+          <a:lstStyle/>
+          <a:p>
+            <a:r>
+              <a:rPr lang="en-US" dirty="0"/>
+              <a:t>Sanjeev Sharma, Andrew , Leon Campbell,  </a:t>
+            </a:r>
+          </a:p>
           <a:p>
             <a:r>
               <a:rPr lang="en-US" dirty="0" err="1"/>
-              <a:t>Cpstn</a:t>
+              <a:t>Advnc</a:t>
             </a:r>
             <a:r>
               <a:rPr lang="en-US" dirty="0"/>
               <a:t> </a:t>
+            </a:r>
+            <a:r>
+              <a:rPr lang="en-US" dirty="0" err="1"/>
+              <a:t>apl:cpstme</a:t>
+            </a:r>
+            <a:r>
+              <a:rPr lang="en-US" dirty="0"/>
+              <a:t> </a:t>
+            </a:r>
+            <a:r>
+              <a:rPr lang="en-US" dirty="0" err="1"/>
+              <a:t>maj</a:t>
+            </a:r>
+            <a:r>
+              <a:rPr lang="en-US" dirty="0"/>
+              <a:t> </a:t>
+            </a:r>
+            <a:r>
+              <a:rPr lang="en-US" dirty="0" err="1"/>
+              <a:t>csci</a:t>
+            </a:r>
+            <a:r>
+              <a:rPr lang="en-US" dirty="0"/>
+              <a:t> 49900</a:t>
+            </a:r>
+          </a:p>
+          <a:p>
+            <a:r>
+              <a:rPr lang="en-US" sz="1200" dirty="0"/>
+              <a:t>2-24-18</a:t>
             </a:r>
           </a:p>
         </p:txBody>
@@ -4059,26 +4106,51 @@
           <a:lstStyle/>
           <a:p>
             <a:pPr algn="ctr"/>
-            <a:r>
-              <a:rPr lang="en-US" dirty="0"/>
-              <a:t>Architecture</a:t>
-            </a:r>
             <a:br>
               <a:rPr lang="en-US" dirty="0"/>
             </a:br>
             <a:r>
               <a:rPr lang="en-US" dirty="0"/>
-              <a:t>NEEDS REST API</a:t>
-            </a:r>
+              <a:t>Architecture</a:t>
+            </a:r>
+          </a:p>
+        </p:txBody>
+      </p:sp>
+      <p:sp>
+        <p:nvSpPr>
+          <p:cNvPr id="5" name="Slide Number Placeholder 4">
+            <a:extLst>
+              <a:ext uri="{FF2B5EF4-FFF2-40B4-BE49-F238E27FC236}">
+                <a16:creationId xmlns:a16="http://schemas.microsoft.com/office/drawing/2014/main" id="{B69AC92F-08AD-4931-A687-4BE29A82E36F}"/>
+              </a:ext>
+            </a:extLst>
+          </p:cNvPr>
+          <p:cNvSpPr>
+            <a:spLocks noGrp="1"/>
+          </p:cNvSpPr>
+          <p:nvPr>
+            <p:ph type="sldNum" sz="quarter" idx="12"/>
+          </p:nvPr>
+        </p:nvSpPr>
+        <p:spPr/>
+        <p:txBody>
+          <a:bodyPr/>
+          <a:lstStyle/>
+          <a:p>
+            <a:fld id="{6D22F896-40B5-4ADD-8801-0D06FADFA095}" type="slidenum">
+              <a:rPr lang="en-US" smtClean="0"/>
+              <a:t>2</a:t>
+            </a:fld>
+            <a:endParaRPr lang="en-US" dirty="0"/>
           </a:p>
         </p:txBody>
       </p:sp>
       <p:pic>
         <p:nvPicPr>
-          <p:cNvPr id="7" name="Content Placeholder 6">
+          <p:cNvPr id="12" name="Content Placeholder 11">
             <a:extLst>
               <a:ext uri="{FF2B5EF4-FFF2-40B4-BE49-F238E27FC236}">
-                <a16:creationId xmlns:a16="http://schemas.microsoft.com/office/drawing/2014/main" id="{89F9D80D-9A1A-4EB6-A7DD-D0BA5AC3D15A}"/>
+                <a16:creationId xmlns:a16="http://schemas.microsoft.com/office/drawing/2014/main" id="{2115686B-0A33-4CE1-9B04-C4A326FD139B}"/>
               </a:ext>
             </a:extLst>
           </p:cNvPr>
@@ -4097,11 +4169,73 @@
         </p:blipFill>
         <p:spPr>
           <a:xfrm>
-            <a:off x="3340100" y="1978025"/>
-            <a:ext cx="5599628" cy="4737116"/>
+            <a:off x="2997201" y="1903132"/>
+            <a:ext cx="6049122" cy="4199505"/>
           </a:xfrm>
         </p:spPr>
       </p:pic>
+    </p:spTree>
+    <p:extLst>
+      <p:ext uri="{BB962C8B-B14F-4D97-AF65-F5344CB8AC3E}">
+        <p14:creationId xmlns:p14="http://schemas.microsoft.com/office/powerpoint/2010/main" val="38023290"/>
+      </p:ext>
+    </p:extLst>
+  </p:cSld>
+  <p:clrMapOvr>
+    <a:masterClrMapping/>
+  </p:clrMapOvr>
+</p:sld>
+</file>
+
+<file path=ppt/slides/slide3.xml><?xml version="1.0" encoding="utf-8"?>
+<p:sld xmlns:a="http://schemas.openxmlformats.org/drawingml/2006/main" xmlns:r="http://schemas.openxmlformats.org/officeDocument/2006/relationships" xmlns:p="http://schemas.openxmlformats.org/presentationml/2006/main">
+  <p:cSld>
+    <p:spTree>
+      <p:nvGrpSpPr>
+        <p:cNvPr id="1" name=""/>
+        <p:cNvGrpSpPr/>
+        <p:nvPr/>
+      </p:nvGrpSpPr>
+      <p:grpSpPr>
+        <a:xfrm>
+          <a:off x="0" y="0"/>
+          <a:ext cx="0" cy="0"/>
+          <a:chOff x="0" y="0"/>
+          <a:chExt cx="0" cy="0"/>
+        </a:xfrm>
+      </p:grpSpPr>
+      <p:sp>
+        <p:nvSpPr>
+          <p:cNvPr id="2" name="Title 1">
+            <a:extLst>
+              <a:ext uri="{FF2B5EF4-FFF2-40B4-BE49-F238E27FC236}">
+                <a16:creationId xmlns:a16="http://schemas.microsoft.com/office/drawing/2014/main" id="{558F5750-163D-4C0A-A833-E947320CA8BF}"/>
+              </a:ext>
+            </a:extLst>
+          </p:cNvPr>
+          <p:cNvSpPr>
+            <a:spLocks noGrp="1"/>
+          </p:cNvSpPr>
+          <p:nvPr>
+            <p:ph type="title"/>
+          </p:nvPr>
+        </p:nvSpPr>
+        <p:spPr/>
+        <p:txBody>
+          <a:bodyPr/>
+          <a:lstStyle/>
+          <a:p>
+            <a:pPr algn="ctr"/>
+            <a:br>
+              <a:rPr lang="en-US" dirty="0"/>
+            </a:br>
+            <a:r>
+              <a:rPr lang="en-US" dirty="0"/>
+              <a:t>Architecture</a:t>
+            </a:r>
+          </a:p>
+        </p:txBody>
+      </p:sp>
       <p:sp>
         <p:nvSpPr>
           <p:cNvPr id="5" name="Slide Number Placeholder 4">
@@ -4125,16 +4259,45 @@
           <a:p>
             <a:fld id="{6D22F896-40B5-4ADD-8801-0D06FADFA095}" type="slidenum">
               <a:rPr lang="en-US" smtClean="0"/>
-              <a:t>2</a:t>
+              <a:t>3</a:t>
             </a:fld>
             <a:endParaRPr lang="en-US" dirty="0"/>
           </a:p>
         </p:txBody>
       </p:sp>
+      <p:pic>
+        <p:nvPicPr>
+          <p:cNvPr id="12" name="Content Placeholder 11">
+            <a:extLst>
+              <a:ext uri="{FF2B5EF4-FFF2-40B4-BE49-F238E27FC236}">
+                <a16:creationId xmlns:a16="http://schemas.microsoft.com/office/drawing/2014/main" id="{2115686B-0A33-4CE1-9B04-C4A326FD139B}"/>
+              </a:ext>
+            </a:extLst>
+          </p:cNvPr>
+          <p:cNvPicPr>
+            <a:picLocks noGrp="1" noChangeAspect="1"/>
+          </p:cNvPicPr>
+          <p:nvPr>
+            <p:ph idx="1"/>
+          </p:nvPr>
+        </p:nvPicPr>
+        <p:blipFill>
+          <a:blip r:embed="rId2"/>
+          <a:stretch>
+            <a:fillRect/>
+          </a:stretch>
+        </p:blipFill>
+        <p:spPr>
+          <a:xfrm>
+            <a:off x="2997201" y="1903132"/>
+            <a:ext cx="6049122" cy="4199505"/>
+          </a:xfrm>
+        </p:spPr>
+      </p:pic>
     </p:spTree>
     <p:extLst>
       <p:ext uri="{BB962C8B-B14F-4D97-AF65-F5344CB8AC3E}">
-        <p14:creationId xmlns:p14="http://schemas.microsoft.com/office/powerpoint/2010/main" val="38023290"/>
+        <p14:creationId xmlns:p14="http://schemas.microsoft.com/office/powerpoint/2010/main" val="3554643879"/>
       </p:ext>
     </p:extLst>
   </p:cSld>

</xml_diff>